<commit_message>
Finalized summit slides fixed
</commit_message>
<xml_diff>
--- a/Reports/2016_01_summit.pptx
+++ b/Reports/2016_01_summit.pptx
@@ -6,7 +6,7 @@
     <p:sldMasterId id="2147483684" r:id="rId2"/>
   </p:sldMasterIdLst>
   <p:notesMasterIdLst>
-    <p:notesMasterId r:id="rId9"/>
+    <p:notesMasterId r:id="rId10"/>
   </p:notesMasterIdLst>
   <p:sldIdLst>
     <p:sldId id="257" r:id="rId3"/>
@@ -15,6 +15,7 @@
     <p:sldId id="263" r:id="rId6"/>
     <p:sldId id="265" r:id="rId7"/>
     <p:sldId id="266" r:id="rId8"/>
+    <p:sldId id="268" r:id="rId9"/>
   </p:sldIdLst>
   <p:sldSz cx="9144000" cy="6858000" type="screen4x3"/>
   <p:notesSz cx="6858000" cy="9144000"/>
@@ -115,7 +116,7 @@
   </p:defaultTextStyle>
   <p:extLst>
     <p:ext uri="{EFAFB233-063F-42B5-8137-9DF3F51BA10A}">
-      <p15:sldGuideLst xmlns:p15="http://schemas.microsoft.com/office/powerpoint/2012/main">
+      <p15:sldGuideLst xmlns="" xmlns:p15="http://schemas.microsoft.com/office/powerpoint/2012/main">
         <p15:guide id="1" orient="horz" pos="2160">
           <p15:clr>
             <a:srgbClr val="A4A3A4"/>
@@ -214,7 +215,7 @@
           <a:p>
             <a:fld id="{4C0BA6A2-2D9F-4B10-9C1A-89C15BF2AB87}" type="datetimeFigureOut">
               <a:rPr lang="en-US" smtClean="0"/>
-              <a:t>1/17/2016</a:t>
+              <a:t>1/18/2016</a:t>
             </a:fld>
             <a:endParaRPr lang="en-US"/>
           </a:p>
@@ -818,7 +819,7 @@
                 </a:solidFill>
               </a:rPr>
               <a:pPr defTabSz="457200"/>
-              <a:t>January 17, 2016</a:t>
+              <a:t>January 18, 2016</a:t>
             </a:fld>
             <a:endParaRPr lang="en-US" dirty="0">
               <a:solidFill>
@@ -971,7 +972,7 @@
                 </a:solidFill>
               </a:rPr>
               <a:pPr defTabSz="457200"/>
-              <a:t>January 17, 2016</a:t>
+              <a:t>January 18, 2016</a:t>
             </a:fld>
             <a:endParaRPr lang="en-US" dirty="0">
               <a:solidFill>
@@ -1170,7 +1171,7 @@
                 </a:solidFill>
               </a:rPr>
               <a:pPr defTabSz="457200"/>
-              <a:t>January 17, 2016</a:t>
+              <a:t>January 18, 2016</a:t>
             </a:fld>
             <a:endParaRPr lang="en-US" dirty="0">
               <a:solidFill>
@@ -1476,7 +1477,7 @@
                 </a:solidFill>
               </a:rPr>
               <a:pPr defTabSz="457200"/>
-              <a:t>January 17, 2016</a:t>
+              <a:t>January 18, 2016</a:t>
             </a:fld>
             <a:endParaRPr lang="en-US" dirty="0">
               <a:solidFill>
@@ -1946,7 +1947,7 @@
                 </a:solidFill>
               </a:rPr>
               <a:pPr defTabSz="457200"/>
-              <a:t>January 17, 2016</a:t>
+              <a:t>January 18, 2016</a:t>
             </a:fld>
             <a:endParaRPr lang="en-US" dirty="0">
               <a:solidFill>
@@ -2669,7 +2670,7 @@
                 </a:solidFill>
               </a:rPr>
               <a:pPr defTabSz="457200"/>
-              <a:t>January 17, 2016</a:t>
+              <a:t>January 18, 2016</a:t>
             </a:fld>
             <a:endParaRPr lang="en-US" dirty="0">
               <a:solidFill>
@@ -2806,7 +2807,7 @@
                 </a:solidFill>
               </a:rPr>
               <a:pPr defTabSz="457200"/>
-              <a:t>January 17, 2016</a:t>
+              <a:t>January 18, 2016</a:t>
             </a:fld>
             <a:endParaRPr lang="en-US" dirty="0">
               <a:solidFill>
@@ -2955,7 +2956,7 @@
                 </a:solidFill>
               </a:rPr>
               <a:pPr defTabSz="457200"/>
-              <a:t>January 17, 2016</a:t>
+              <a:t>January 18, 2016</a:t>
             </a:fld>
             <a:endParaRPr lang="en-US" dirty="0">
               <a:solidFill>
@@ -3251,7 +3252,7 @@
                 </a:solidFill>
               </a:rPr>
               <a:pPr defTabSz="457200"/>
-              <a:t>January 17, 2016</a:t>
+              <a:t>January 18, 2016</a:t>
             </a:fld>
             <a:endParaRPr lang="en-US" dirty="0">
               <a:solidFill>
@@ -3764,7 +3765,7 @@
                 </a:solidFill>
               </a:rPr>
               <a:pPr defTabSz="457200"/>
-              <a:t>January 17, 2016</a:t>
+              <a:t>January 18, 2016</a:t>
             </a:fld>
             <a:endParaRPr lang="en-US" dirty="0">
               <a:solidFill>
@@ -3981,7 +3982,7 @@
                 </a:solidFill>
               </a:rPr>
               <a:pPr defTabSz="457200"/>
-              <a:t>January 17, 2016</a:t>
+              <a:t>January 18, 2016</a:t>
             </a:fld>
             <a:endParaRPr lang="en-US" dirty="0">
               <a:solidFill>
@@ -4180,7 +4181,7 @@
                 </a:solidFill>
               </a:rPr>
               <a:pPr defTabSz="457200"/>
-              <a:t>January 17, 2016</a:t>
+              <a:t>January 18, 2016</a:t>
             </a:fld>
             <a:endParaRPr lang="en-US" dirty="0">
               <a:solidFill>
@@ -4445,7 +4446,7 @@
                 </a:solidFill>
               </a:rPr>
               <a:pPr defTabSz="457200"/>
-              <a:t>January 17, 2016</a:t>
+              <a:t>January 18, 2016</a:t>
             </a:fld>
             <a:endParaRPr lang="en-US" dirty="0">
               <a:solidFill>
@@ -5168,7 +5169,7 @@
                 </a:solidFill>
               </a:rPr>
               <a:pPr defTabSz="457200"/>
-              <a:t>January 17, 2016</a:t>
+              <a:t>January 18, 2016</a:t>
             </a:fld>
             <a:endParaRPr lang="en-US" dirty="0">
               <a:solidFill>
@@ -5305,7 +5306,7 @@
                 </a:solidFill>
               </a:rPr>
               <a:pPr defTabSz="457200"/>
-              <a:t>January 17, 2016</a:t>
+              <a:t>January 18, 2016</a:t>
             </a:fld>
             <a:endParaRPr lang="en-US" dirty="0">
               <a:solidFill>
@@ -5454,7 +5455,7 @@
                 </a:solidFill>
               </a:rPr>
               <a:pPr defTabSz="457200"/>
-              <a:t>January 17, 2016</a:t>
+              <a:t>January 18, 2016</a:t>
             </a:fld>
             <a:endParaRPr lang="en-US" dirty="0">
               <a:solidFill>
@@ -5750,7 +5751,7 @@
                 </a:solidFill>
               </a:rPr>
               <a:pPr defTabSz="457200"/>
-              <a:t>January 17, 2016</a:t>
+              <a:t>January 18, 2016</a:t>
             </a:fld>
             <a:endParaRPr lang="en-US" dirty="0">
               <a:solidFill>
@@ -6022,7 +6023,7 @@
                 </a:solidFill>
               </a:rPr>
               <a:pPr defTabSz="457200"/>
-              <a:t>January 17, 2016</a:t>
+              <a:t>January 18, 2016</a:t>
             </a:fld>
             <a:endParaRPr lang="en-US" dirty="0">
               <a:solidFill>
@@ -7286,18 +7287,7 @@
           <a:p>
             <a:r>
               <a:rPr lang="en-US" dirty="0" smtClean="0"/>
-              <a:t>Project Title</a:t>
-            </a:r>
-            <a:r>
-              <a:rPr lang="en-US" sz="2400" dirty="0" smtClean="0"/>
-              <a:t/>
-            </a:r>
-            <a:br>
-              <a:rPr lang="en-US" sz="2400" dirty="0" smtClean="0"/>
-            </a:br>
-            <a:r>
-              <a:rPr lang="en-US" sz="2400" dirty="0" smtClean="0"/>
-              <a:t>(sub-title if helpful)</a:t>
+              <a:t>Anaerobic Bioconversion of Methane to Methanol</a:t>
             </a:r>
             <a:endParaRPr lang="en-US" sz="2400" dirty="0"/>
           </a:p>
@@ -7314,52 +7304,64 @@
           </p:nvPr>
         </p:nvSpPr>
         <p:spPr/>
+        <p:txBody>
+          <a:bodyPr>
+            <a:normAutofit fontScale="92500"/>
+          </a:bodyPr>
+          <a:lstStyle/>
+          <a:p>
+            <a:r>
+              <a:rPr lang="en-US" dirty="0" smtClean="0"/>
+              <a:t>Steve Ragsdale, John Leigh, Nathan Price, Simone </a:t>
+            </a:r>
+            <a:r>
+              <a:rPr lang="en-US" dirty="0" err="1" smtClean="0"/>
+              <a:t>Raugei</a:t>
+            </a:r>
+            <a:endParaRPr lang="en-US" dirty="0" smtClean="0"/>
+          </a:p>
+          <a:p>
+            <a:r>
+              <a:rPr lang="en-US" dirty="0" smtClean="0"/>
+              <a:t>Steve Ragsdale (sragsdal@umich.edu) </a:t>
+            </a:r>
+            <a:endParaRPr lang="en-US" dirty="0"/>
+          </a:p>
+        </p:txBody>
+      </p:sp>
+      <p:sp>
+        <p:nvSpPr>
+          <p:cNvPr id="4" name="Date Placeholder 3"/>
+          <p:cNvSpPr>
+            <a:spLocks noGrp="1"/>
+          </p:cNvSpPr>
+          <p:nvPr>
+            <p:ph type="dt" sz="half" idx="10"/>
+          </p:nvPr>
+        </p:nvSpPr>
+        <p:spPr>
+          <a:xfrm>
+            <a:off x="685799" y="5053572"/>
+            <a:ext cx="6467475" cy="365125"/>
+          </a:xfrm>
+        </p:spPr>
         <p:txBody>
           <a:bodyPr/>
           <a:lstStyle/>
           <a:p>
             <a:r>
-              <a:rPr lang="en-US" dirty="0" smtClean="0"/>
-              <a:t>Project Team</a:t>
-            </a:r>
-          </a:p>
-          <a:p>
-            <a:r>
-              <a:rPr lang="en-US" dirty="0" smtClean="0"/>
-              <a:t>PI Name and Email </a:t>
-            </a:r>
-            <a:endParaRPr lang="en-US" dirty="0"/>
-          </a:p>
-        </p:txBody>
-      </p:sp>
-      <p:sp>
-        <p:nvSpPr>
-          <p:cNvPr id="4" name="Date Placeholder 3"/>
-          <p:cNvSpPr>
-            <a:spLocks noGrp="1"/>
-          </p:cNvSpPr>
-          <p:nvPr>
-            <p:ph type="dt" sz="half" idx="10"/>
-          </p:nvPr>
-        </p:nvSpPr>
-        <p:spPr>
-          <a:xfrm>
-            <a:off x="685799" y="5053572"/>
-            <a:ext cx="6467475" cy="365125"/>
-          </a:xfrm>
-        </p:spPr>
-        <p:txBody>
-          <a:bodyPr/>
-          <a:lstStyle/>
-          <a:p>
-            <a:r>
               <a:rPr lang="en-US" dirty="0" smtClean="0">
                 <a:solidFill>
                   <a:prstClr val="black"/>
                 </a:solidFill>
               </a:rPr>
-              <a:t>Meeting Name</a:t>
-            </a:r>
+              <a:t>REMOTE Program Review</a:t>
+            </a:r>
+            <a:endParaRPr lang="en-US" dirty="0" smtClean="0">
+              <a:solidFill>
+                <a:prstClr val="black"/>
+              </a:solidFill>
+            </a:endParaRPr>
           </a:p>
           <a:p>
             <a:r>
@@ -7368,7 +7370,7 @@
                   <a:prstClr val="black"/>
                 </a:solidFill>
               </a:rPr>
-              <a:t>Date</a:t>
+              <a:t>01/20/2016</a:t>
             </a:r>
             <a:endParaRPr lang="en-US" dirty="0">
               <a:solidFill>
@@ -7463,12 +7465,14 @@
         </p:nvSpPr>
         <p:spPr/>
         <p:txBody>
-          <a:bodyPr/>
+          <a:bodyPr>
+            <a:normAutofit fontScale="90000"/>
+          </a:bodyPr>
           <a:lstStyle/>
           <a:p>
             <a:r>
-              <a:rPr lang="en-US" dirty="0" smtClean="0"/>
-              <a:t>Project title</a:t>
+              <a:rPr lang="en-US" dirty="0"/>
+              <a:t>Anaerobic Bioconversion of Methane to Methanol</a:t>
             </a:r>
             <a:endParaRPr lang="en-US" dirty="0"/>
           </a:p>
@@ -7668,12 +7672,14 @@
         </p:nvSpPr>
         <p:spPr/>
         <p:txBody>
-          <a:bodyPr/>
+          <a:bodyPr>
+            <a:normAutofit fontScale="90000"/>
+          </a:bodyPr>
           <a:lstStyle/>
           <a:p>
             <a:r>
-              <a:rPr lang="en-US" dirty="0" smtClean="0"/>
-              <a:t>Project title</a:t>
+              <a:rPr lang="en-US" dirty="0"/>
+              <a:t>Anaerobic Bioconversion of Methane to Methanol</a:t>
             </a:r>
             <a:endParaRPr lang="en-US" dirty="0"/>
           </a:p>
@@ -7896,12 +7902,14 @@
         </p:nvSpPr>
         <p:spPr/>
         <p:txBody>
-          <a:bodyPr/>
+          <a:bodyPr>
+            <a:normAutofit fontScale="90000"/>
+          </a:bodyPr>
           <a:lstStyle/>
           <a:p>
             <a:r>
-              <a:rPr lang="en-US" dirty="0" smtClean="0"/>
-              <a:t>Project title</a:t>
+              <a:rPr lang="en-US" dirty="0"/>
+              <a:t>Anaerobic Bioconversion of Methane to Methanol</a:t>
             </a:r>
             <a:endParaRPr lang="en-US" dirty="0"/>
           </a:p>
@@ -8724,23 +8732,7 @@
                   <a:srgbClr val="000000"/>
                 </a:solidFill>
               </a:rPr>
-              <a:t>The same constraint prevents </a:t>
-            </a:r>
-            <a:r>
-              <a:rPr lang="en-US" sz="2000" b="1" dirty="0" smtClean="0">
-                <a:solidFill>
-                  <a:srgbClr val="000000"/>
-                </a:solidFill>
-              </a:rPr>
-              <a:t>growth through </a:t>
-            </a:r>
-            <a:r>
-              <a:rPr lang="en-US" sz="2000" b="1" dirty="0" smtClean="0">
-                <a:solidFill>
-                  <a:srgbClr val="000000"/>
-                </a:solidFill>
-              </a:rPr>
-              <a:t>reverse </a:t>
+              <a:t>The same constraint prevents growth through reverse </a:t>
             </a:r>
             <a:r>
               <a:rPr lang="en-US" sz="2000" b="1" dirty="0" err="1" smtClean="0">
@@ -8840,12 +8832,14 @@
         </p:nvSpPr>
         <p:spPr/>
         <p:txBody>
-          <a:bodyPr/>
+          <a:bodyPr>
+            <a:normAutofit fontScale="90000"/>
+          </a:bodyPr>
           <a:lstStyle/>
           <a:p>
             <a:r>
-              <a:rPr lang="en-US" dirty="0" smtClean="0"/>
-              <a:t>Project title</a:t>
+              <a:rPr lang="en-US" dirty="0"/>
+              <a:t>Anaerobic Bioconversion of Methane to Methanol</a:t>
             </a:r>
             <a:endParaRPr lang="en-US" dirty="0"/>
           </a:p>
@@ -9240,12 +9234,14 @@
         </p:nvSpPr>
         <p:spPr/>
         <p:txBody>
-          <a:bodyPr/>
+          <a:bodyPr>
+            <a:normAutofit fontScale="90000"/>
+          </a:bodyPr>
           <a:lstStyle/>
           <a:p>
             <a:r>
-              <a:rPr lang="en-US" dirty="0" smtClean="0"/>
-              <a:t>Project title</a:t>
+              <a:rPr lang="en-US" dirty="0"/>
+              <a:t>Anaerobic Bioconversion of Methane to Methanol</a:t>
             </a:r>
             <a:endParaRPr lang="en-US" dirty="0"/>
           </a:p>
@@ -9338,6 +9334,238 @@
     <p:bldLst>
       <p:bldP spid="11" grpId="0" animBg="1"/>
     </p:bldLst>
+  </p:timing>
+</p:sld>
+</file>
+
+<file path=ppt/slides/slide7.xml><?xml version="1.0" encoding="utf-8"?>
+<p:sld xmlns:a="http://schemas.openxmlformats.org/drawingml/2006/main" xmlns:r="http://schemas.openxmlformats.org/officeDocument/2006/relationships" xmlns:p="http://schemas.openxmlformats.org/presentationml/2006/main">
+  <p:cSld>
+    <p:spTree>
+      <p:nvGrpSpPr>
+        <p:cNvPr id="1" name=""/>
+        <p:cNvGrpSpPr/>
+        <p:nvPr/>
+      </p:nvGrpSpPr>
+      <p:grpSpPr>
+        <a:xfrm>
+          <a:off x="0" y="0"/>
+          <a:ext cx="0" cy="0"/>
+          <a:chOff x="0" y="0"/>
+          <a:chExt cx="0" cy="0"/>
+        </a:xfrm>
+      </p:grpSpPr>
+      <p:sp>
+        <p:nvSpPr>
+          <p:cNvPr id="4" name="Slide Number Placeholder 3"/>
+          <p:cNvSpPr>
+            <a:spLocks noGrp="1"/>
+          </p:cNvSpPr>
+          <p:nvPr>
+            <p:ph type="sldNum" sz="quarter" idx="12"/>
+          </p:nvPr>
+        </p:nvSpPr>
+        <p:spPr/>
+        <p:txBody>
+          <a:bodyPr/>
+          <a:lstStyle/>
+          <a:p>
+            <a:fld id="{F49B8720-E526-BD45-92D7-B4028BF31DDE}" type="slidenum">
+              <a:rPr lang="en-US" smtClean="0">
+                <a:solidFill>
+                  <a:prstClr val="black">
+                    <a:tint val="75000"/>
+                  </a:prstClr>
+                </a:solidFill>
+              </a:rPr>
+              <a:pPr/>
+              <a:t>7</a:t>
+            </a:fld>
+            <a:endParaRPr lang="en-US" dirty="0">
+              <a:solidFill>
+                <a:prstClr val="black">
+                  <a:tint val="75000"/>
+                </a:prstClr>
+              </a:solidFill>
+            </a:endParaRPr>
+          </a:p>
+        </p:txBody>
+      </p:sp>
+      <p:sp>
+        <p:nvSpPr>
+          <p:cNvPr id="10" name="TextBox 9"/>
+          <p:cNvSpPr txBox="1"/>
+          <p:nvPr/>
+        </p:nvSpPr>
+        <p:spPr>
+          <a:xfrm>
+            <a:off x="2383009" y="6322814"/>
+            <a:ext cx="4797082" cy="369332"/>
+          </a:xfrm>
+          <a:prstGeom prst="rect">
+            <a:avLst/>
+          </a:prstGeom>
+          <a:noFill/>
+        </p:spPr>
+        <p:txBody>
+          <a:bodyPr wrap="none" rtlCol="0">
+            <a:spAutoFit/>
+          </a:bodyPr>
+          <a:lstStyle/>
+          <a:p>
+            <a:pPr defTabSz="457200"/>
+            <a:r>
+              <a:rPr lang="en-US" dirty="0">
+                <a:solidFill>
+                  <a:prstClr val="black"/>
+                </a:solidFill>
+              </a:rPr>
+              <a:t>Protected Data – For DOE ARPA-E Use Only</a:t>
+            </a:r>
+          </a:p>
+        </p:txBody>
+      </p:sp>
+      <p:sp>
+        <p:nvSpPr>
+          <p:cNvPr id="12" name="Text Box 7"/>
+          <p:cNvSpPr txBox="1">
+            <a:spLocks noChangeArrowheads="1"/>
+          </p:cNvSpPr>
+          <p:nvPr/>
+        </p:nvSpPr>
+        <p:spPr bwMode="auto">
+          <a:xfrm>
+            <a:off x="323850" y="923925"/>
+            <a:ext cx="5193030" cy="369332"/>
+          </a:xfrm>
+          <a:prstGeom prst="rect">
+            <a:avLst/>
+          </a:prstGeom>
+          <a:noFill/>
+          <a:ln w="9525">
+            <a:noFill/>
+            <a:miter lim="800000"/>
+            <a:headEnd/>
+            <a:tailEnd/>
+          </a:ln>
+        </p:spPr>
+        <p:txBody>
+          <a:bodyPr wrap="square">
+            <a:spAutoFit/>
+          </a:bodyPr>
+          <a:lstStyle/>
+          <a:p>
+            <a:pPr defTabSz="457200">
+              <a:spcBef>
+                <a:spcPct val="50000"/>
+              </a:spcBef>
+            </a:pPr>
+            <a:r>
+              <a:rPr lang="en-US" b="1" dirty="0">
+                <a:solidFill>
+                  <a:srgbClr val="1AB0E9"/>
+                </a:solidFill>
+              </a:rPr>
+              <a:t>Progress on core technology development</a:t>
+            </a:r>
+          </a:p>
+        </p:txBody>
+      </p:sp>
+      <p:sp>
+        <p:nvSpPr>
+          <p:cNvPr id="13" name="Title 6"/>
+          <p:cNvSpPr>
+            <a:spLocks noGrp="1"/>
+          </p:cNvSpPr>
+          <p:nvPr>
+            <p:ph type="title"/>
+          </p:nvPr>
+        </p:nvSpPr>
+        <p:spPr/>
+        <p:txBody>
+          <a:bodyPr>
+            <a:normAutofit fontScale="90000"/>
+          </a:bodyPr>
+          <a:lstStyle/>
+          <a:p>
+            <a:r>
+              <a:rPr lang="en-US" dirty="0"/>
+              <a:t>Anaerobic Bioconversion of Methane to Methanol</a:t>
+            </a:r>
+            <a:endParaRPr lang="en-US" dirty="0"/>
+          </a:p>
+        </p:txBody>
+      </p:sp>
+      <p:pic>
+        <p:nvPicPr>
+          <p:cNvPr id="1027" name="Picture 3"/>
+          <p:cNvPicPr>
+            <a:picLocks noChangeAspect="1" noChangeArrowheads="1"/>
+          </p:cNvPicPr>
+          <p:nvPr/>
+        </p:nvPicPr>
+        <p:blipFill>
+          <a:blip r:embed="rId2">
+            <a:extLst>
+              <a:ext uri="{28A0092B-C50C-407E-A947-70E740481C1C}">
+                <a14:useLocalDpi xmlns:a14="http://schemas.microsoft.com/office/drawing/2010/main" val="0"/>
+              </a:ext>
+            </a:extLst>
+          </a:blip>
+          <a:srcRect/>
+          <a:stretch>
+            <a:fillRect/>
+          </a:stretch>
+        </p:blipFill>
+        <p:spPr bwMode="auto">
+          <a:xfrm>
+            <a:off x="876300" y="1268604"/>
+            <a:ext cx="6819900" cy="4909762"/>
+          </a:xfrm>
+          <a:prstGeom prst="rect">
+            <a:avLst/>
+          </a:prstGeom>
+          <a:noFill/>
+          <a:ln>
+            <a:noFill/>
+          </a:ln>
+          <a:extLst>
+            <a:ext uri="{909E8E84-426E-40DD-AFC4-6F175D3DCCD1}">
+              <a14:hiddenFill xmlns:a14="http://schemas.microsoft.com/office/drawing/2010/main">
+                <a:solidFill>
+                  <a:schemeClr val="accent1"/>
+                </a:solidFill>
+              </a14:hiddenFill>
+            </a:ext>
+            <a:ext uri="{91240B29-F687-4F45-9708-019B960494DF}">
+              <a14:hiddenLine xmlns:a14="http://schemas.microsoft.com/office/drawing/2010/main" w="9525">
+                <a:solidFill>
+                  <a:schemeClr val="tx1"/>
+                </a:solidFill>
+                <a:miter lim="800000"/>
+                <a:headEnd/>
+                <a:tailEnd/>
+              </a14:hiddenLine>
+            </a:ext>
+          </a:extLst>
+        </p:spPr>
+      </p:pic>
+    </p:spTree>
+    <p:extLst>
+      <p:ext uri="{BB962C8B-B14F-4D97-AF65-F5344CB8AC3E}">
+        <p14:creationId xmlns:p14="http://schemas.microsoft.com/office/powerpoint/2010/main" val="1541872709"/>
+      </p:ext>
+    </p:extLst>
+  </p:cSld>
+  <p:clrMapOvr>
+    <a:masterClrMapping/>
+  </p:clrMapOvr>
+  <p:timing>
+    <p:tnLst>
+      <p:par>
+        <p:cTn id="1" dur="indefinite" restart="never" nodeType="tmRoot"/>
+      </p:par>
+    </p:tnLst>
   </p:timing>
 </p:sld>
 </file>

</xml_diff>